<commit_message>
Added powerpoint from poster and poster png
</commit_message>
<xml_diff>
--- a/Documents/SETU Research Poster Background (Landscape) (PowerPoint).pptx
+++ b/Documents/SETU Research Poster Background (Landscape) (PowerPoint).pptx
@@ -3048,12 +3048,12 @@
         <p:spPr>
           <a:xfrm>
             <a:off x="3213020" y="6097097"/>
-            <a:ext cx="32130206" cy="11936903"/>
+            <a:ext cx="32130206" cy="14854590"/>
           </a:xfrm>
         </p:spPr>
         <p:txBody>
           <a:bodyPr>
-            <a:normAutofit/>
+            <a:normAutofit lnSpcReduction="10000"/>
           </a:bodyPr>
           <a:lstStyle/>
           <a:p>
@@ -3066,25 +3066,42 @@
           <a:p>
             <a:pPr algn="l"/>
             <a:r>
-              <a:rPr lang="en-US" sz="4000" dirty="0">
+              <a:rPr lang="en-US" sz="9600" dirty="0">
                 <a:latin typeface="Inter Light" panose="02000503000000020004" pitchFamily="2" charset="0"/>
                 <a:ea typeface="Inter Light" panose="02000503000000020004" pitchFamily="2" charset="0"/>
               </a:rPr>
-              <a:t>The game I am creating is a multiplayer online mining PVPVE game that is integrated with blockchain technologies and specifically an ecosystem and SDK provided by </a:t>
-            </a:r>
-            <a:r>
-              <a:rPr lang="en-US" sz="4000" dirty="0" err="1">
+              <a:t>The project is a multiplayer/online mining PVPVE (Player vs Player vs Environment) based game that is integrated with blockchain technologies and specifically an ecosystem and SDK provided by </a:t>
+            </a:r>
+            <a:r>
+              <a:rPr lang="en-US" sz="9600" dirty="0" err="1">
                 <a:latin typeface="Inter Light" panose="02000503000000020004" pitchFamily="2" charset="0"/>
                 <a:ea typeface="Inter Light" panose="02000503000000020004" pitchFamily="2" charset="0"/>
               </a:rPr>
               <a:t>Enjin</a:t>
             </a:r>
             <a:r>
-              <a:rPr lang="en-US" sz="4000">
+              <a:rPr lang="en-US" sz="9600" dirty="0">
                 <a:latin typeface="Inter Light" panose="02000503000000020004" pitchFamily="2" charset="0"/>
                 <a:ea typeface="Inter Light" panose="02000503000000020004" pitchFamily="2" charset="0"/>
               </a:rPr>
-              <a:t>.</a:t>
+              <a:t>. It is developed using Unity 3D (Game engine), and fish networking (Multiplayer components).</a:t>
+            </a:r>
+          </a:p>
+          <a:p>
+            <a:pPr algn="l"/>
+            <a:endParaRPr lang="en-US" sz="2800" dirty="0">
+              <a:latin typeface="Inter Light" panose="02000503000000020004" pitchFamily="2" charset="0"/>
+              <a:ea typeface="Inter Light" panose="02000503000000020004" pitchFamily="2" charset="0"/>
+            </a:endParaRPr>
+          </a:p>
+          <a:p>
+            <a:pPr algn="l"/>
+            <a:r>
+              <a:rPr lang="en-US" sz="9600" dirty="0">
+                <a:latin typeface="Inter Light" panose="02000503000000020004" pitchFamily="2" charset="0"/>
+                <a:ea typeface="Inter Light" panose="02000503000000020004" pitchFamily="2" charset="0"/>
+              </a:rPr>
+              <a:t>Contact Details:</a:t>
             </a:r>
             <a:endParaRPr lang="en-US" sz="4000" dirty="0">
               <a:latin typeface="Inter Light" panose="02000503000000020004" pitchFamily="2" charset="0"/>
@@ -3093,7 +3110,47 @@
           </a:p>
           <a:p>
             <a:pPr algn="l"/>
-            <a:endParaRPr lang="en-US" sz="4000" dirty="0">
+            <a:r>
+              <a:rPr lang="en-US" sz="7200" dirty="0">
+                <a:latin typeface="Inter Light" panose="02000503000000020004" pitchFamily="2" charset="0"/>
+                <a:ea typeface="Inter Light" panose="02000503000000020004" pitchFamily="2" charset="0"/>
+              </a:rPr>
+              <a:t>     Andrew Greenslade - (</a:t>
+            </a:r>
+            <a:r>
+              <a:rPr lang="en-US" sz="7200" dirty="0">
+                <a:latin typeface="Inter Light" panose="02000503000000020004" pitchFamily="2" charset="0"/>
+                <a:ea typeface="Inter Light" panose="02000503000000020004" pitchFamily="2" charset="0"/>
+                <a:hlinkClick r:id="rId3"/>
+              </a:rPr>
+              <a:t>https://www.linkedin.com/in/andrew-greenslade</a:t>
+            </a:r>
+            <a:r>
+              <a:rPr lang="en-US" sz="7200" dirty="0">
+                <a:latin typeface="Inter Light" panose="02000503000000020004" pitchFamily="2" charset="0"/>
+                <a:ea typeface="Inter Light" panose="02000503000000020004" pitchFamily="2" charset="0"/>
+              </a:rPr>
+              <a:t>)</a:t>
+            </a:r>
+          </a:p>
+          <a:p>
+            <a:pPr algn="l"/>
+            <a:r>
+              <a:rPr lang="en-US" sz="7200" dirty="0">
+                <a:latin typeface="Inter Light" panose="02000503000000020004" pitchFamily="2" charset="0"/>
+                <a:ea typeface="Inter Light" panose="02000503000000020004" pitchFamily="2" charset="0"/>
+              </a:rPr>
+              <a:t>     </a:t>
+            </a:r>
+            <a:r>
+              <a:rPr lang="en-US" sz="7200" dirty="0">
+                <a:latin typeface="Inter Light" panose="02000503000000020004" pitchFamily="2" charset="0"/>
+                <a:ea typeface="Inter Light" panose="02000503000000020004" pitchFamily="2" charset="0"/>
+                <a:hlinkClick r:id="rId4"/>
+              </a:rPr>
+              <a:t>andrew@greensladegames.com</a:t>
+            </a:r>
+            <a:endParaRPr lang="en-US" sz="7200" dirty="0">
               <a:latin typeface="Inter Light" panose="02000503000000020004" pitchFamily="2" charset="0"/>
               <a:ea typeface="Inter Light" panose="02000503000000020004" pitchFamily="2" charset="0"/>
             </a:endParaRPr>
@@ -3101,22 +3158,138 @@
           <a:p>
             <a:pPr algn="l"/>
             <a:r>
-              <a:rPr lang="en-US" sz="4000" dirty="0">
+              <a:rPr lang="en-US" sz="7200" dirty="0">
                 <a:latin typeface="Inter Light" panose="02000503000000020004" pitchFamily="2" charset="0"/>
                 <a:ea typeface="Inter Light" panose="02000503000000020004" pitchFamily="2" charset="0"/>
               </a:rPr>
-              <a:t>Contact Details:</a:t>
-            </a:r>
-          </a:p>
-          <a:p>
-            <a:pPr algn="l"/>
-            <a:endParaRPr lang="en-US" sz="4000" dirty="0">
+              <a:t>     </a:t>
+            </a:r>
+            <a:r>
+              <a:rPr lang="en-US" sz="7200" dirty="0" err="1">
+                <a:latin typeface="Inter Light" panose="02000503000000020004" pitchFamily="2" charset="0"/>
+                <a:ea typeface="Inter Light" panose="02000503000000020004" pitchFamily="2" charset="0"/>
+              </a:rPr>
+              <a:t>AndrewGreenslade</a:t>
+            </a:r>
+            <a:r>
+              <a:rPr lang="en-US" sz="7200" dirty="0">
+                <a:latin typeface="Inter Light" panose="02000503000000020004" pitchFamily="2" charset="0"/>
+                <a:ea typeface="Inter Light" panose="02000503000000020004" pitchFamily="2" charset="0"/>
+              </a:rPr>
+              <a:t> - (</a:t>
+            </a:r>
+            <a:r>
+              <a:rPr lang="en-US" sz="7200" dirty="0">
+                <a:latin typeface="Inter Light" panose="02000503000000020004" pitchFamily="2" charset="0"/>
+                <a:ea typeface="Inter Light" panose="02000503000000020004" pitchFamily="2" charset="0"/>
+                <a:hlinkClick r:id="rId5"/>
+              </a:rPr>
+              <a:t>https://github.com/AndrewGreenslade</a:t>
+            </a:r>
+            <a:r>
+              <a:rPr lang="en-US" sz="7200" dirty="0">
+                <a:latin typeface="Inter Light" panose="02000503000000020004" pitchFamily="2" charset="0"/>
+                <a:ea typeface="Inter Light" panose="02000503000000020004" pitchFamily="2" charset="0"/>
+              </a:rPr>
+              <a:t>)   </a:t>
+            </a:r>
+            <a:endParaRPr lang="en-US" sz="28700" dirty="0">
               <a:latin typeface="Inter Light" panose="02000503000000020004" pitchFamily="2" charset="0"/>
               <a:ea typeface="Inter Light" panose="02000503000000020004" pitchFamily="2" charset="0"/>
             </a:endParaRPr>
           </a:p>
         </p:txBody>
       </p:sp>
+      <p:pic>
+        <p:nvPicPr>
+          <p:cNvPr id="5" name="Picture 4">
+            <a:extLst>
+              <a:ext uri="{FF2B5EF4-FFF2-40B4-BE49-F238E27FC236}">
+                <a16:creationId xmlns:a16="http://schemas.microsoft.com/office/drawing/2014/main" id="{024665BC-4CF9-9DD2-0805-4E6173651560}"/>
+              </a:ext>
+            </a:extLst>
+          </p:cNvPr>
+          <p:cNvPicPr>
+            <a:picLocks noChangeAspect="1"/>
+          </p:cNvPicPr>
+          <p:nvPr/>
+        </p:nvPicPr>
+        <p:blipFill>
+          <a:blip r:embed="rId6"/>
+          <a:stretch>
+            <a:fillRect/>
+          </a:stretch>
+        </p:blipFill>
+        <p:spPr>
+          <a:xfrm>
+            <a:off x="3213020" y="16165228"/>
+            <a:ext cx="952500" cy="952500"/>
+          </a:xfrm>
+          <a:prstGeom prst="rect">
+            <a:avLst/>
+          </a:prstGeom>
+        </p:spPr>
+      </p:pic>
+      <p:pic>
+        <p:nvPicPr>
+          <p:cNvPr id="7" name="Picture 6">
+            <a:extLst>
+              <a:ext uri="{FF2B5EF4-FFF2-40B4-BE49-F238E27FC236}">
+                <a16:creationId xmlns:a16="http://schemas.microsoft.com/office/drawing/2014/main" id="{B54025A5-CBB4-B716-9EE7-8C28008B2F6D}"/>
+              </a:ext>
+            </a:extLst>
+          </p:cNvPr>
+          <p:cNvPicPr>
+            <a:picLocks noChangeAspect="1"/>
+          </p:cNvPicPr>
+          <p:nvPr/>
+        </p:nvPicPr>
+        <p:blipFill>
+          <a:blip r:embed="rId7"/>
+          <a:stretch>
+            <a:fillRect/>
+          </a:stretch>
+        </p:blipFill>
+        <p:spPr>
+          <a:xfrm>
+            <a:off x="3213020" y="17630839"/>
+            <a:ext cx="952500" cy="952500"/>
+          </a:xfrm>
+          <a:prstGeom prst="rect">
+            <a:avLst/>
+          </a:prstGeom>
+        </p:spPr>
+      </p:pic>
+      <p:pic>
+        <p:nvPicPr>
+          <p:cNvPr id="9" name="Picture 8">
+            <a:extLst>
+              <a:ext uri="{FF2B5EF4-FFF2-40B4-BE49-F238E27FC236}">
+                <a16:creationId xmlns:a16="http://schemas.microsoft.com/office/drawing/2014/main" id="{0249CBF0-5A9E-5546-7AC1-E9FA5BEC029F}"/>
+              </a:ext>
+            </a:extLst>
+          </p:cNvPr>
+          <p:cNvPicPr>
+            <a:picLocks noChangeAspect="1"/>
+          </p:cNvPicPr>
+          <p:nvPr/>
+        </p:nvPicPr>
+        <p:blipFill>
+          <a:blip r:embed="rId8"/>
+          <a:stretch>
+            <a:fillRect/>
+          </a:stretch>
+        </p:blipFill>
+        <p:spPr>
+          <a:xfrm>
+            <a:off x="3213020" y="19047784"/>
+            <a:ext cx="952500" cy="952500"/>
+          </a:xfrm>
+          <a:prstGeom prst="rect">
+            <a:avLst/>
+          </a:prstGeom>
+        </p:spPr>
+      </p:pic>
     </p:spTree>
     <p:extLst>
       <p:ext uri="{BB962C8B-B14F-4D97-AF65-F5344CB8AC3E}">
@@ -3392,26 +3565,6 @@
 </file>
 
 <file path=customXml/item1.xml><?xml version="1.0" encoding="utf-8"?>
-<p:properties xmlns:p="http://schemas.microsoft.com/office/2006/metadata/properties" xmlns:xsi="http://www.w3.org/2001/XMLSchema-instance" xmlns:pc="http://schemas.microsoft.com/office/infopath/2007/PartnerControls">
-  <documentManagement>
-    <lcf76f155ced4ddcb4097134ff3c332f xmlns="c2604f75-035f-4bcf-b8d3-05bab17d453d">
-      <Terms xmlns="http://schemas.microsoft.com/office/infopath/2007/PartnerControls"/>
-    </lcf76f155ced4ddcb4097134ff3c332f>
-    <TaxCatchAll xmlns="e6b9e509-b424-4da0-b943-ec4d48415bba" xsi:nil="true"/>
-  </documentManagement>
-</p:properties>
-</file>
-
-<file path=customXml/item2.xml><?xml version="1.0" encoding="utf-8"?>
-<?mso-contentType ?>
-<FormTemplates xmlns="http://schemas.microsoft.com/sharepoint/v3/contenttype/forms">
-  <Display>DocumentLibraryForm</Display>
-  <Edit>DocumentLibraryForm</Edit>
-  <New>DocumentLibraryForm</New>
-</FormTemplates>
-</file>
-
-<file path=customXml/item3.xml><?xml version="1.0" encoding="utf-8"?>
 <ct:contentTypeSchema xmlns:ct="http://schemas.microsoft.com/office/2006/metadata/contentType" xmlns:ma="http://schemas.microsoft.com/office/2006/metadata/properties/metaAttributes" ct:_="" ma:_="" ma:contentTypeName="Document" ma:contentTypeID="0x0101005121EDCB449F27409E57881B74983F07" ma:contentTypeVersion="15" ma:contentTypeDescription="Create a new document." ma:contentTypeScope="" ma:versionID="e8cbf1bc234d9e75b3fb47cf0ddbe8d2">
   <xsd:schema xmlns:xsd="http://www.w3.org/2001/XMLSchema" xmlns:xs="http://www.w3.org/2001/XMLSchema" xmlns:p="http://schemas.microsoft.com/office/2006/metadata/properties" xmlns:ns2="c2604f75-035f-4bcf-b8d3-05bab17d453d" xmlns:ns3="e6b9e509-b424-4da0-b943-ec4d48415bba" targetNamespace="http://schemas.microsoft.com/office/2006/metadata/properties" ma:root="true" ma:fieldsID="cb20f4739b4a7f2dc429abb756e3d79e" ns2:_="" ns3:_="">
     <xsd:import namespace="c2604f75-035f-4bcf-b8d3-05bab17d453d"/>
@@ -3642,26 +3795,27 @@
 </ct:contentTypeSchema>
 </file>
 
-<file path=customXml/itemProps1.xml><?xml version="1.0" encoding="utf-8"?>
-<ds:datastoreItem xmlns:ds="http://schemas.openxmlformats.org/officeDocument/2006/customXml" ds:itemID="{0B3DE961-962B-4235-AD86-32B7AAFD7FA2}">
-  <ds:schemaRefs>
-    <ds:schemaRef ds:uri="http://schemas.microsoft.com/office/2006/metadata/properties"/>
-    <ds:schemaRef ds:uri="http://schemas.microsoft.com/office/infopath/2007/PartnerControls"/>
-    <ds:schemaRef ds:uri="c2604f75-035f-4bcf-b8d3-05bab17d453d"/>
-    <ds:schemaRef ds:uri="e6b9e509-b424-4da0-b943-ec4d48415bba"/>
-  </ds:schemaRefs>
-</ds:datastoreItem>
+<file path=customXml/item2.xml><?xml version="1.0" encoding="utf-8"?>
+<?mso-contentType ?>
+<FormTemplates xmlns="http://schemas.microsoft.com/sharepoint/v3/contenttype/forms">
+  <Display>DocumentLibraryForm</Display>
+  <Edit>DocumentLibraryForm</Edit>
+  <New>DocumentLibraryForm</New>
+</FormTemplates>
 </file>
 
-<file path=customXml/itemProps2.xml><?xml version="1.0" encoding="utf-8"?>
-<ds:datastoreItem xmlns:ds="http://schemas.openxmlformats.org/officeDocument/2006/customXml" ds:itemID="{262E4DBE-4B75-4600-AD88-99A0FA7337EC}">
-  <ds:schemaRefs>
-    <ds:schemaRef ds:uri="http://schemas.microsoft.com/sharepoint/v3/contenttype/forms"/>
-  </ds:schemaRefs>
-</ds:datastoreItem>
+<file path=customXml/item3.xml><?xml version="1.0" encoding="utf-8"?>
+<p:properties xmlns:p="http://schemas.microsoft.com/office/2006/metadata/properties" xmlns:xsi="http://www.w3.org/2001/XMLSchema-instance" xmlns:pc="http://schemas.microsoft.com/office/infopath/2007/PartnerControls">
+  <documentManagement>
+    <lcf76f155ced4ddcb4097134ff3c332f xmlns="c2604f75-035f-4bcf-b8d3-05bab17d453d">
+      <Terms xmlns="http://schemas.microsoft.com/office/infopath/2007/PartnerControls"/>
+    </lcf76f155ced4ddcb4097134ff3c332f>
+    <TaxCatchAll xmlns="e6b9e509-b424-4da0-b943-ec4d48415bba" xsi:nil="true"/>
+  </documentManagement>
+</p:properties>
 </file>
 
-<file path=customXml/itemProps3.xml><?xml version="1.0" encoding="utf-8"?>
+<file path=customXml/itemProps1.xml><?xml version="1.0" encoding="utf-8"?>
 <ds:datastoreItem xmlns:ds="http://schemas.openxmlformats.org/officeDocument/2006/customXml" ds:itemID="{2181E940-CB6D-4428-AE62-BAB6E47DE695}">
   <ds:schemaRefs>
     <ds:schemaRef ds:uri="http://schemas.microsoft.com/office/2006/metadata/contentType"/>
@@ -3678,4 +3832,23 @@
     <ds:schemaRef ds:uri="http://schemas.microsoft.com/internal/obd"/>
   </ds:schemaRefs>
 </ds:datastoreItem>
+</file>
+
+<file path=customXml/itemProps2.xml><?xml version="1.0" encoding="utf-8"?>
+<ds:datastoreItem xmlns:ds="http://schemas.openxmlformats.org/officeDocument/2006/customXml" ds:itemID="{262E4DBE-4B75-4600-AD88-99A0FA7337EC}">
+  <ds:schemaRefs>
+    <ds:schemaRef ds:uri="http://schemas.microsoft.com/sharepoint/v3/contenttype/forms"/>
+  </ds:schemaRefs>
+</ds:datastoreItem>
+</file>
+
+<file path=customXml/itemProps3.xml><?xml version="1.0" encoding="utf-8"?>
+<ds:datastoreItem xmlns:ds="http://schemas.openxmlformats.org/officeDocument/2006/customXml" ds:itemID="{0B3DE961-962B-4235-AD86-32B7AAFD7FA2}">
+  <ds:schemaRefs>
+    <ds:schemaRef ds:uri="http://schemas.microsoft.com/office/2006/metadata/properties"/>
+    <ds:schemaRef ds:uri="http://schemas.microsoft.com/office/infopath/2007/PartnerControls"/>
+    <ds:schemaRef ds:uri="c2604f75-035f-4bcf-b8d3-05bab17d453d"/>
+    <ds:schemaRef ds:uri="e6b9e509-b424-4da0-b943-ec4d48415bba"/>
+  </ds:schemaRefs>
+</ds:datastoreItem>
 </file>
</xml_diff>